<commit_message>
Accessibility Course Documents Review
some doc changes and edits
</commit_message>
<xml_diff>
--- a/slide-decks/ACCESS/how-to-review-course-materials/accessiblecoursedoccuments2016.pptx
+++ b/slide-decks/ACCESS/how-to-review-course-materials/accessiblecoursedoccuments2016.pptx
@@ -11,9 +11,7 @@
     <p:sldId id="259" r:id="rId5"/>
     <p:sldId id="260" r:id="rId6"/>
     <p:sldId id="261" r:id="rId7"/>
-    <p:sldId id="262" r:id="rId8"/>
-    <p:sldId id="263" r:id="rId9"/>
-    <p:sldId id="264" r:id="rId10"/>
+    <p:sldId id="266" r:id="rId8"/>
   </p:sldIdLst>
   <p:sldSz cx="9144000" cy="6858000" type="screen4x3"/>
   <p:notesSz cx="6858000" cy="9144000"/>
@@ -296,7 +294,7 @@
           <a:p>
             <a:fld id="{E51FFC31-3782-4CFB-B12A-43B216E1ECD8}" type="datetimeFigureOut">
               <a:rPr lang="en-US" smtClean="0"/>
-              <a:t>9/22/2016</a:t>
+              <a:t>1/26/17</a:t>
             </a:fld>
             <a:endParaRPr lang="en-US"/>
           </a:p>
@@ -466,7 +464,7 @@
           <a:p>
             <a:fld id="{E51FFC31-3782-4CFB-B12A-43B216E1ECD8}" type="datetimeFigureOut">
               <a:rPr lang="en-US" smtClean="0"/>
-              <a:t>9/22/2016</a:t>
+              <a:t>1/26/17</a:t>
             </a:fld>
             <a:endParaRPr lang="en-US"/>
           </a:p>
@@ -646,7 +644,7 @@
           <a:p>
             <a:fld id="{E51FFC31-3782-4CFB-B12A-43B216E1ECD8}" type="datetimeFigureOut">
               <a:rPr lang="en-US" smtClean="0"/>
-              <a:t>9/22/2016</a:t>
+              <a:t>1/26/17</a:t>
             </a:fld>
             <a:endParaRPr lang="en-US"/>
           </a:p>
@@ -816,7 +814,7 @@
           <a:p>
             <a:fld id="{E51FFC31-3782-4CFB-B12A-43B216E1ECD8}" type="datetimeFigureOut">
               <a:rPr lang="en-US" smtClean="0"/>
-              <a:t>9/22/2016</a:t>
+              <a:t>1/26/17</a:t>
             </a:fld>
             <a:endParaRPr lang="en-US"/>
           </a:p>
@@ -1062,7 +1060,7 @@
           <a:p>
             <a:fld id="{E51FFC31-3782-4CFB-B12A-43B216E1ECD8}" type="datetimeFigureOut">
               <a:rPr lang="en-US" smtClean="0"/>
-              <a:t>9/22/2016</a:t>
+              <a:t>1/26/17</a:t>
             </a:fld>
             <a:endParaRPr lang="en-US"/>
           </a:p>
@@ -1350,7 +1348,7 @@
           <a:p>
             <a:fld id="{E51FFC31-3782-4CFB-B12A-43B216E1ECD8}" type="datetimeFigureOut">
               <a:rPr lang="en-US" smtClean="0"/>
-              <a:t>9/22/2016</a:t>
+              <a:t>1/26/17</a:t>
             </a:fld>
             <a:endParaRPr lang="en-US"/>
           </a:p>
@@ -1772,7 +1770,7 @@
           <a:p>
             <a:fld id="{E51FFC31-3782-4CFB-B12A-43B216E1ECD8}" type="datetimeFigureOut">
               <a:rPr lang="en-US" smtClean="0"/>
-              <a:t>9/22/2016</a:t>
+              <a:t>1/26/17</a:t>
             </a:fld>
             <a:endParaRPr lang="en-US"/>
           </a:p>
@@ -1890,7 +1888,7 @@
           <a:p>
             <a:fld id="{E51FFC31-3782-4CFB-B12A-43B216E1ECD8}" type="datetimeFigureOut">
               <a:rPr lang="en-US" smtClean="0"/>
-              <a:t>9/22/2016</a:t>
+              <a:t>1/26/17</a:t>
             </a:fld>
             <a:endParaRPr lang="en-US"/>
           </a:p>
@@ -1985,7 +1983,7 @@
           <a:p>
             <a:fld id="{E51FFC31-3782-4CFB-B12A-43B216E1ECD8}" type="datetimeFigureOut">
               <a:rPr lang="en-US" smtClean="0"/>
-              <a:t>9/22/2016</a:t>
+              <a:t>1/26/17</a:t>
             </a:fld>
             <a:endParaRPr lang="en-US"/>
           </a:p>
@@ -2262,7 +2260,7 @@
           <a:p>
             <a:fld id="{E51FFC31-3782-4CFB-B12A-43B216E1ECD8}" type="datetimeFigureOut">
               <a:rPr lang="en-US" smtClean="0"/>
-              <a:t>9/22/2016</a:t>
+              <a:t>1/26/17</a:t>
             </a:fld>
             <a:endParaRPr lang="en-US"/>
           </a:p>
@@ -2515,7 +2513,7 @@
           <a:p>
             <a:fld id="{E51FFC31-3782-4CFB-B12A-43B216E1ECD8}" type="datetimeFigureOut">
               <a:rPr lang="en-US" smtClean="0"/>
-              <a:t>9/22/2016</a:t>
+              <a:t>1/26/17</a:t>
             </a:fld>
             <a:endParaRPr lang="en-US"/>
           </a:p>
@@ -2728,7 +2726,7 @@
           <a:p>
             <a:fld id="{E51FFC31-3782-4CFB-B12A-43B216E1ECD8}" type="datetimeFigureOut">
               <a:rPr lang="en-US" smtClean="0"/>
-              <a:t>9/22/2016</a:t>
+              <a:t>1/26/17</a:t>
             </a:fld>
             <a:endParaRPr lang="en-US"/>
           </a:p>
@@ -3115,12 +3113,14 @@
         </p:nvSpPr>
         <p:spPr>
           <a:xfrm>
-            <a:off x="685800" y="2133600"/>
-            <a:ext cx="7772400" cy="1470025"/>
+            <a:off x="685800" y="685800"/>
+            <a:ext cx="7772400" cy="762000"/>
           </a:xfrm>
         </p:spPr>
         <p:txBody>
-          <a:bodyPr/>
+          <a:bodyPr>
+            <a:normAutofit fontScale="90000"/>
+          </a:bodyPr>
           <a:lstStyle/>
           <a:p>
             <a:r>
@@ -3131,6 +3131,9 @@
               <a:rPr lang="en-US" dirty="0" smtClean="0"/>
               <a:t>Documents</a:t>
             </a:r>
+            <a:br>
+              <a:rPr lang="en-US" dirty="0" smtClean="0"/>
+            </a:br>
             <a:r>
               <a:rPr lang="en-US" dirty="0" smtClean="0"/>
               <a:t>			</a:t>
@@ -3141,29 +3144,185 @@
       </p:sp>
       <p:sp>
         <p:nvSpPr>
-          <p:cNvPr id="3" name="Subtitle 2"/>
-          <p:cNvSpPr>
-            <a:spLocks noGrp="1"/>
-          </p:cNvSpPr>
-          <p:nvPr>
-            <p:ph type="subTitle" idx="1"/>
-          </p:nvPr>
+          <p:cNvPr id="4" name="TextBox 3"/>
+          <p:cNvSpPr txBox="1"/>
+          <p:nvPr/>
         </p:nvSpPr>
         <p:spPr>
           <a:xfrm>
-            <a:off x="1371600" y="3886200"/>
-            <a:ext cx="6400800" cy="1752600"/>
+            <a:off x="3124200" y="1219200"/>
+            <a:ext cx="3352800" cy="3170099"/>
           </a:xfrm>
+          <a:prstGeom prst="rect">
+            <a:avLst/>
+          </a:prstGeom>
+          <a:noFill/>
         </p:spPr>
         <p:txBody>
-          <a:bodyPr/>
-          <a:lstStyle/>
-          <a:p>
-            <a:r>
-              <a:rPr lang="en-US" dirty="0" smtClean="0"/>
-              <a:t>Access For All</a:t>
-            </a:r>
-            <a:endParaRPr lang="en-US" dirty="0"/>
+          <a:bodyPr wrap="square" rtlCol="0">
+            <a:spAutoFit/>
+          </a:bodyPr>
+          <a:lstStyle/>
+          <a:p>
+            <a:r>
+              <a:rPr lang="en-US" sz="4000" dirty="0" smtClean="0"/>
+              <a:t>S - styles</a:t>
+            </a:r>
+            <a:r>
+              <a:rPr lang="en-US" sz="4000" dirty="0"/>
+              <a:t/>
+            </a:r>
+            <a:br>
+              <a:rPr lang="en-US" sz="4000" dirty="0"/>
+            </a:br>
+            <a:r>
+              <a:rPr lang="en-US" sz="4000" dirty="0" smtClean="0"/>
+              <a:t>L - links</a:t>
+            </a:r>
+            <a:r>
+              <a:rPr lang="en-US" sz="4000" dirty="0"/>
+              <a:t/>
+            </a:r>
+            <a:br>
+              <a:rPr lang="en-US" sz="4000" dirty="0"/>
+            </a:br>
+            <a:r>
+              <a:rPr lang="en-US" sz="4000" dirty="0" smtClean="0"/>
+              <a:t>I - images</a:t>
+            </a:r>
+            <a:r>
+              <a:rPr lang="en-US" sz="4000" dirty="0"/>
+              <a:t/>
+            </a:r>
+            <a:br>
+              <a:rPr lang="en-US" sz="4000" dirty="0"/>
+            </a:br>
+            <a:r>
+              <a:rPr lang="en-US" sz="4000" dirty="0" smtClean="0"/>
+              <a:t>D - design</a:t>
+            </a:r>
+            <a:r>
+              <a:rPr lang="en-US" sz="4000" dirty="0"/>
+              <a:t/>
+            </a:r>
+            <a:br>
+              <a:rPr lang="en-US" sz="4000" dirty="0"/>
+            </a:br>
+            <a:r>
+              <a:rPr lang="en-US" sz="4000" dirty="0" smtClean="0"/>
+              <a:t>E - empathy</a:t>
+            </a:r>
+            <a:endParaRPr lang="en-US" sz="4000" dirty="0"/>
+          </a:p>
+        </p:txBody>
+      </p:sp>
+      <p:sp>
+        <p:nvSpPr>
+          <p:cNvPr id="5" name="TextBox 4"/>
+          <p:cNvSpPr txBox="1"/>
+          <p:nvPr/>
+        </p:nvSpPr>
+        <p:spPr>
+          <a:xfrm>
+            <a:off x="0" y="4611231"/>
+            <a:ext cx="9144000" cy="2246769"/>
+          </a:xfrm>
+          <a:prstGeom prst="rect">
+            <a:avLst/>
+          </a:prstGeom>
+          <a:noFill/>
+        </p:spPr>
+        <p:txBody>
+          <a:bodyPr wrap="square" rtlCol="0">
+            <a:spAutoFit/>
+          </a:bodyPr>
+          <a:lstStyle/>
+          <a:p>
+            <a:pPr algn="ctr"/>
+            <a:r>
+              <a:rPr lang="en-US" sz="2800" dirty="0" smtClean="0">
+                <a:solidFill>
+                  <a:schemeClr val="tx1">
+                    <a:lumMod val="50000"/>
+                    <a:lumOff val="50000"/>
+                  </a:schemeClr>
+                </a:solidFill>
+              </a:rPr>
+              <a:t>Scott Smith, Assistive </a:t>
+            </a:r>
+            <a:r>
+              <a:rPr lang="en-US" sz="2800" smtClean="0">
+                <a:solidFill>
+                  <a:schemeClr val="tx1">
+                    <a:lumMod val="50000"/>
+                    <a:lumOff val="50000"/>
+                  </a:schemeClr>
+                </a:solidFill>
+              </a:rPr>
+              <a:t>Technology Specialist</a:t>
+            </a:r>
+            <a:endParaRPr lang="en-US" sz="2800" dirty="0" smtClean="0">
+              <a:solidFill>
+                <a:schemeClr val="tx1">
+                  <a:lumMod val="50000"/>
+                  <a:lumOff val="50000"/>
+                </a:schemeClr>
+              </a:solidFill>
+            </a:endParaRPr>
+          </a:p>
+          <a:p>
+            <a:pPr algn="ctr"/>
+            <a:r>
+              <a:rPr lang="en-US" sz="2800" dirty="0" err="1" smtClean="0">
+                <a:solidFill>
+                  <a:schemeClr val="tx1">
+                    <a:lumMod val="50000"/>
+                    <a:lumOff val="50000"/>
+                  </a:schemeClr>
+                </a:solidFill>
+              </a:rPr>
+              <a:t>dssmith@uscupstate.edu</a:t>
+            </a:r>
+            <a:endParaRPr lang="en-US" sz="2800" dirty="0" smtClean="0">
+              <a:solidFill>
+                <a:schemeClr val="tx1">
+                  <a:lumMod val="50000"/>
+                  <a:lumOff val="50000"/>
+                </a:schemeClr>
+              </a:solidFill>
+            </a:endParaRPr>
+          </a:p>
+          <a:p>
+            <a:pPr algn="ctr"/>
+            <a:r>
+              <a:rPr lang="en-US" sz="2800" dirty="0" smtClean="0">
+                <a:solidFill>
+                  <a:schemeClr val="tx1">
+                    <a:lumMod val="50000"/>
+                    <a:lumOff val="50000"/>
+                  </a:schemeClr>
+                </a:solidFill>
+              </a:rPr>
+              <a:t>864-503-5199</a:t>
+            </a:r>
+          </a:p>
+          <a:p>
+            <a:pPr algn="ctr"/>
+            <a:r>
+              <a:rPr lang="en-US" sz="2800" dirty="0" smtClean="0">
+                <a:solidFill>
+                  <a:schemeClr val="tx1">
+                    <a:lumMod val="50000"/>
+                    <a:lumOff val="50000"/>
+                  </a:schemeClr>
+                </a:solidFill>
+              </a:rPr>
+              <a:t>Campus Life Center, Suite 108</a:t>
+            </a:r>
+          </a:p>
+          <a:p>
+            <a:pPr algn="ctr"/>
+            <a:endParaRPr lang="en-US" sz="2800" dirty="0"/>
           </a:p>
         </p:txBody>
       </p:sp>
@@ -3180,7 +3339,7 @@
   <p:timing>
     <p:tnLst>
       <p:par>
-        <p:cTn id="1" dur="indefinite" restart="never" nodeType="tmRoot"/>
+        <p:cTn xmlns:p14="http://schemas.microsoft.com/office/powerpoint/2010/main" id="1" dur="indefinite" restart="never" nodeType="tmRoot"/>
       </p:par>
     </p:tnLst>
   </p:timing>
@@ -3244,15 +3403,15 @@
           <a:p>
             <a:r>
               <a:rPr lang="en-US" dirty="0" smtClean="0"/>
-              <a:t>Styles are the most important part of creating accessible course material.  They help you prepare your </a:t>
-            </a:r>
-            <a:r>
-              <a:rPr lang="en-US" dirty="0" smtClean="0"/>
-              <a:t>document </a:t>
-            </a:r>
-            <a:r>
-              <a:rPr lang="en-US" dirty="0" smtClean="0"/>
-              <a:t>for tagging if converting to PDF.  </a:t>
+              <a:t>Styles are the most important part of creating accessible course material. </a:t>
+            </a:r>
+            <a:r>
+              <a:rPr lang="en-US" dirty="0" smtClean="0"/>
+              <a:t>For one thing, they </a:t>
+            </a:r>
+            <a:r>
+              <a:rPr lang="en-US" dirty="0" smtClean="0"/>
+              <a:t>help you prepare your document for tagging if converting to PDF.  </a:t>
             </a:r>
             <a:endParaRPr lang="en-US" dirty="0"/>
           </a:p>
@@ -3275,35 +3434,15 @@
           <a:p>
             <a:r>
               <a:rPr lang="en-US" dirty="0" smtClean="0"/>
-              <a:t>Headings help you </a:t>
-            </a:r>
-            <a:r>
-              <a:rPr lang="en-US" dirty="0" smtClean="0"/>
-              <a:t>arrange </a:t>
-            </a:r>
-            <a:r>
-              <a:rPr lang="en-US" dirty="0" smtClean="0"/>
-              <a:t>the </a:t>
-            </a:r>
-            <a:r>
-              <a:rPr lang="en-US" dirty="0" smtClean="0"/>
-              <a:t>document's </a:t>
-            </a:r>
-            <a:r>
-              <a:rPr lang="en-US" dirty="0" smtClean="0"/>
-              <a:t>information in an order of </a:t>
-            </a:r>
-            <a:r>
-              <a:rPr lang="en-US" dirty="0" smtClean="0"/>
-              <a:t>important.  </a:t>
-            </a:r>
-            <a:r>
-              <a:rPr lang="en-US" dirty="0" smtClean="0"/>
-              <a:t>They also help screen reader users to more quickly navigate larger </a:t>
-            </a:r>
-            <a:r>
-              <a:rPr lang="en-US" dirty="0" smtClean="0"/>
-              <a:t>documents.  </a:t>
+              <a:t>Headings help you arrange the document's information in an order of </a:t>
+            </a:r>
+            <a:r>
+              <a:rPr lang="en-US" dirty="0" smtClean="0"/>
+              <a:t>importance.  </a:t>
+            </a:r>
+            <a:r>
+              <a:rPr lang="en-US" dirty="0" smtClean="0"/>
+              <a:t>They also help screen reader users to more quickly navigate larger documents.  </a:t>
             </a:r>
             <a:endParaRPr lang="en-US" dirty="0"/>
           </a:p>
@@ -3322,7 +3461,7 @@
   <p:timing>
     <p:tnLst>
       <p:par>
-        <p:cTn id="1" dur="indefinite" restart="never" nodeType="tmRoot"/>
+        <p:cTn xmlns:p14="http://schemas.microsoft.com/office/powerpoint/2010/main" id="1" dur="indefinite" restart="never" nodeType="tmRoot"/>
       </p:par>
     </p:tnLst>
   </p:timing>
@@ -3379,20 +3518,25 @@
             <p:ph sz="half" idx="1"/>
           </p:nvPr>
         </p:nvSpPr>
-        <p:spPr/>
+        <p:spPr>
+          <a:xfrm>
+            <a:off x="457200" y="1447800"/>
+            <a:ext cx="4038600" cy="4525963"/>
+          </a:xfrm>
+        </p:spPr>
         <p:txBody>
           <a:bodyPr>
-            <a:normAutofit fontScale="85000" lnSpcReduction="20000"/>
+            <a:normAutofit fontScale="92500"/>
           </a:bodyPr>
           <a:lstStyle/>
           <a:p>
             <a:r>
               <a:rPr lang="en-US" dirty="0" smtClean="0"/>
-              <a:t>Links should be correctly labeled within the text of the </a:t>
-            </a:r>
-            <a:r>
-              <a:rPr lang="en-US" dirty="0" smtClean="0"/>
-              <a:t>document.</a:t>
+              <a:t>Links should be correctly labeled within the text of the document</a:t>
+            </a:r>
+            <a:r>
+              <a:rPr lang="en-US" dirty="0"/>
+              <a:t>. The most common “Click Here” text is not appropriate.  This label does not tell the screen reader any information about the link as the screen reader user tabs through the document</a:t>
             </a:r>
             <a:endParaRPr lang="en-US" dirty="0"/>
           </a:p>
@@ -3416,29 +3560,21 @@
         </p:spPr>
         <p:txBody>
           <a:bodyPr>
-            <a:normAutofit fontScale="85000" lnSpcReduction="20000"/>
+            <a:normAutofit fontScale="92500"/>
           </a:bodyPr>
           <a:lstStyle/>
           <a:p>
             <a:r>
-              <a:rPr lang="en-US" dirty="0" smtClean="0"/>
-              <a:t>The most common “Click Here” label is not appropriate.  The label does not tell the screen reader any information about the link as the user tabs through the </a:t>
-            </a:r>
-            <a:r>
-              <a:rPr lang="en-US" dirty="0" smtClean="0"/>
-              <a:t>document.  </a:t>
-            </a:r>
-            <a:r>
-              <a:rPr lang="en-US" dirty="0" smtClean="0"/>
-              <a:t>Screen reader users also use a feature called a links list to quickly pull all links from a </a:t>
-            </a:r>
-            <a:r>
-              <a:rPr lang="en-US" dirty="0" smtClean="0"/>
-              <a:t>document.  </a:t>
-            </a:r>
-            <a:r>
-              <a:rPr lang="en-US" dirty="0" smtClean="0"/>
-              <a:t>When the link is labeled as a “Click Here” link that is the info given to the screen reader in this mode.  </a:t>
+              <a:rPr lang="en-US" dirty="0"/>
+              <a:t>Screen reader </a:t>
+            </a:r>
+            <a:r>
+              <a:rPr lang="en-US" dirty="0" smtClean="0"/>
+              <a:t>users also  </a:t>
+            </a:r>
+            <a:r>
+              <a:rPr lang="en-US" dirty="0"/>
+              <a:t>use a feature called a links list to quickly pull all links from a document.  When the link is labeled as a “Click Here” link that is the only info given to the screen reader in this mode. </a:t>
             </a:r>
             <a:endParaRPr lang="en-US" dirty="0"/>
           </a:p>
@@ -3457,7 +3593,7 @@
   <p:timing>
     <p:tnLst>
       <p:par>
-        <p:cTn id="1" dur="indefinite" restart="never" nodeType="tmRoot"/>
+        <p:cTn xmlns:p14="http://schemas.microsoft.com/office/powerpoint/2010/main" id="1" dur="indefinite" restart="never" nodeType="tmRoot"/>
       </p:par>
     </p:tnLst>
   </p:timing>
@@ -3517,25 +3653,37 @@
         <p:spPr/>
         <p:txBody>
           <a:bodyPr>
-            <a:normAutofit fontScale="85000" lnSpcReduction="10000"/>
+            <a:normAutofit fontScale="92500" lnSpcReduction="20000"/>
           </a:bodyPr>
           <a:lstStyle/>
           <a:p>
             <a:r>
               <a:rPr lang="en-US" dirty="0" smtClean="0"/>
-              <a:t>It is </a:t>
-            </a:r>
-            <a:r>
-              <a:rPr lang="en-US" dirty="0" smtClean="0"/>
-              <a:t>courteous </a:t>
-            </a:r>
-            <a:r>
-              <a:rPr lang="en-US" dirty="0" smtClean="0"/>
-              <a:t>to provide an alternate text description for all images within a </a:t>
-            </a:r>
-            <a:r>
-              <a:rPr lang="en-US" dirty="0" smtClean="0"/>
-              <a:t>document.  </a:t>
+              <a:t>P</a:t>
+            </a:r>
+            <a:r>
+              <a:rPr lang="en-US" dirty="0" smtClean="0"/>
+              <a:t>rovide </a:t>
+            </a:r>
+            <a:r>
+              <a:rPr lang="en-US" dirty="0" smtClean="0"/>
+              <a:t>an alternate text description for all images within a document. </a:t>
+            </a:r>
+            <a:r>
+              <a:rPr lang="en-US" dirty="0" smtClean="0"/>
+              <a:t>When you do this, </a:t>
+            </a:r>
+            <a:r>
+              <a:rPr lang="en-US" dirty="0"/>
+              <a:t>s</a:t>
+            </a:r>
+            <a:r>
+              <a:rPr lang="en-US" dirty="0" smtClean="0"/>
+              <a:t>creen reader users will be able to hear your textual description of the image. Alternative text also helps search </a:t>
+            </a:r>
+            <a:r>
+              <a:rPr lang="en-US" dirty="0" smtClean="0"/>
+              <a:t>engines index content.</a:t>
             </a:r>
             <a:endParaRPr lang="en-US" dirty="0"/>
           </a:p>
@@ -3559,37 +3707,37 @@
         </p:spPr>
         <p:txBody>
           <a:bodyPr>
-            <a:normAutofit fontScale="85000" lnSpcReduction="10000"/>
+            <a:normAutofit fontScale="92500" lnSpcReduction="20000"/>
           </a:bodyPr>
           <a:lstStyle/>
           <a:p>
             <a:r>
               <a:rPr lang="en-US" dirty="0" smtClean="0"/>
-              <a:t>When an </a:t>
-            </a:r>
-            <a:r>
-              <a:rPr lang="en-US" dirty="0" smtClean="0"/>
-              <a:t>image </a:t>
-            </a:r>
-            <a:r>
-              <a:rPr lang="en-US" dirty="0" smtClean="0"/>
-              <a:t>does not have a text description, a screen reader user may hear something random in reference to the </a:t>
-            </a:r>
-            <a:r>
-              <a:rPr lang="en-US" dirty="0" smtClean="0"/>
-              <a:t>image. </a:t>
-            </a:r>
-            <a:r>
-              <a:rPr lang="en-US" dirty="0" smtClean="0"/>
-              <a:t>The most common announcement is </a:t>
-            </a:r>
-            <a:r>
-              <a:rPr lang="en-US" dirty="0" smtClean="0"/>
-              <a:t>“image” </a:t>
-            </a:r>
-            <a:r>
-              <a:rPr lang="en-US" dirty="0" smtClean="0"/>
-              <a:t>and a series of numbers.  This is meaningless to the screen reader user, and can become time consuming as the numbers are sometimes very lengthy.  </a:t>
+              <a:t>When an image does not have a text description, a screen reader user </a:t>
+            </a:r>
+            <a:r>
+              <a:rPr lang="en-US" dirty="0" smtClean="0"/>
+              <a:t>usually hears </a:t>
+            </a:r>
+            <a:r>
+              <a:rPr lang="en-US" dirty="0" smtClean="0"/>
+              <a:t>something </a:t>
+            </a:r>
+            <a:r>
+              <a:rPr lang="en-US" dirty="0" smtClean="0"/>
+              <a:t>random associated with the image. They most commonly hear </a:t>
+            </a:r>
+            <a:r>
+              <a:rPr lang="en-US" dirty="0" smtClean="0"/>
+              <a:t>“image” and a series of numbers.  This is meaningless to the screen reader user, </a:t>
+            </a:r>
+            <a:r>
+              <a:rPr lang="en-US" dirty="0" smtClean="0"/>
+              <a:t>and often time-consuming </a:t>
+            </a:r>
+            <a:r>
+              <a:rPr lang="en-US" dirty="0" smtClean="0"/>
+              <a:t>as the numbers are sometimes very lengthy. </a:t>
             </a:r>
             <a:endParaRPr lang="en-US" dirty="0"/>
           </a:p>
@@ -3608,7 +3756,7 @@
   <p:timing>
     <p:tnLst>
       <p:par>
-        <p:cTn id="1" dur="indefinite" restart="never" nodeType="tmRoot"/>
+        <p:cTn xmlns:p14="http://schemas.microsoft.com/office/powerpoint/2010/main" id="1" dur="indefinite" restart="never" nodeType="tmRoot"/>
       </p:par>
     </p:tnLst>
   </p:timing>
@@ -3674,23 +3822,15 @@
           <a:p>
             <a:r>
               <a:rPr lang="en-US" dirty="0" smtClean="0"/>
-              <a:t>When designing a </a:t>
-            </a:r>
-            <a:r>
-              <a:rPr lang="en-US" dirty="0" smtClean="0"/>
-              <a:t>document </a:t>
-            </a:r>
-            <a:r>
-              <a:rPr lang="en-US" dirty="0" smtClean="0"/>
-              <a:t>please insure that there is sufficient contrast </a:t>
-            </a:r>
-            <a:r>
-              <a:rPr lang="en-US" dirty="0" smtClean="0"/>
-              <a:t>between text </a:t>
-            </a:r>
-            <a:r>
-              <a:rPr lang="en-US" dirty="0" smtClean="0"/>
-              <a:t>and background.</a:t>
+              <a:t>When designing a document please </a:t>
+            </a:r>
+            <a:r>
+              <a:rPr lang="en-US" dirty="0" smtClean="0"/>
+              <a:t>ensure </a:t>
+            </a:r>
+            <a:r>
+              <a:rPr lang="en-US" dirty="0" smtClean="0"/>
+              <a:t>that there is sufficient contrast between text and background.</a:t>
             </a:r>
           </a:p>
           <a:p>
@@ -3702,19 +3842,7 @@
           <a:p>
             <a:r>
               <a:rPr lang="en-US" dirty="0" smtClean="0"/>
-              <a:t>Use </a:t>
-            </a:r>
-            <a:r>
-              <a:rPr lang="en-US" dirty="0" smtClean="0"/>
-              <a:t>consistent </a:t>
-            </a:r>
-            <a:r>
-              <a:rPr lang="en-US" dirty="0" smtClean="0"/>
-              <a:t>design patterns to create a cohesive easily understood </a:t>
-            </a:r>
-            <a:r>
-              <a:rPr lang="en-US" dirty="0" smtClean="0"/>
-              <a:t>document.  </a:t>
+              <a:t>Use consistent design patterns to create a cohesive easily understood document.  </a:t>
             </a:r>
             <a:endParaRPr lang="en-US" dirty="0"/>
           </a:p>
@@ -3744,27 +3872,23 @@
           <a:p>
             <a:r>
               <a:rPr lang="en-US" dirty="0" smtClean="0"/>
-              <a:t>Cohesive design is key to the reader’s understand of information in a </a:t>
-            </a:r>
-            <a:r>
-              <a:rPr lang="en-US" dirty="0" smtClean="0"/>
-              <a:t>document.  </a:t>
-            </a:r>
-            <a:r>
-              <a:rPr lang="en-US" dirty="0" smtClean="0"/>
-              <a:t>When designing a </a:t>
-            </a:r>
-            <a:r>
-              <a:rPr lang="en-US" dirty="0" smtClean="0"/>
-              <a:t>document </a:t>
-            </a:r>
-            <a:r>
-              <a:rPr lang="en-US" dirty="0" smtClean="0"/>
-              <a:t>use predictable patterns to make navigation quicker for readers who may use alternative technology to access the </a:t>
-            </a:r>
-            <a:r>
-              <a:rPr lang="en-US" dirty="0" smtClean="0"/>
-              <a:t>document.</a:t>
+              <a:t>Cohesive design is key to the reader’s </a:t>
+            </a:r>
+            <a:r>
+              <a:rPr lang="en-US" dirty="0" smtClean="0"/>
+              <a:t>understanding of the information </a:t>
+            </a:r>
+            <a:r>
+              <a:rPr lang="en-US" dirty="0" smtClean="0"/>
+              <a:t>in a document.  When designing a </a:t>
+            </a:r>
+            <a:r>
+              <a:rPr lang="en-US" dirty="0" smtClean="0"/>
+              <a:t>document, </a:t>
+            </a:r>
+            <a:r>
+              <a:rPr lang="en-US" dirty="0" smtClean="0"/>
+              <a:t>use predictable patterns to make navigation quicker for readers who may use alternative technology to access the document.</a:t>
             </a:r>
             <a:endParaRPr lang="en-US" dirty="0"/>
           </a:p>
@@ -3783,7 +3907,7 @@
   <p:timing>
     <p:tnLst>
       <p:par>
-        <p:cTn id="1" dur="indefinite" restart="never" nodeType="tmRoot"/>
+        <p:cTn xmlns:p14="http://schemas.microsoft.com/office/powerpoint/2010/main" id="1" dur="indefinite" restart="never" nodeType="tmRoot"/>
       </p:par>
     </p:tnLst>
   </p:timing>
@@ -3843,29 +3967,17 @@
         <p:spPr/>
         <p:txBody>
           <a:bodyPr>
-            <a:normAutofit lnSpcReduction="10000"/>
+            <a:normAutofit fontScale="92500" lnSpcReduction="10000"/>
           </a:bodyPr>
           <a:lstStyle/>
           <a:p>
             <a:r>
               <a:rPr lang="en-US" dirty="0" smtClean="0"/>
-              <a:t>When designing your </a:t>
-            </a:r>
-            <a:r>
-              <a:rPr lang="en-US" dirty="0" smtClean="0"/>
-              <a:t>document </a:t>
-            </a:r>
-            <a:r>
-              <a:rPr lang="en-US" dirty="0" smtClean="0"/>
-              <a:t>give thought to the usability of the </a:t>
-            </a:r>
-            <a:r>
-              <a:rPr lang="en-US" dirty="0" smtClean="0"/>
-              <a:t>document.  </a:t>
-            </a:r>
-            <a:r>
-              <a:rPr lang="en-US" dirty="0" smtClean="0"/>
-              <a:t>Think about the audience and their needs.  </a:t>
+              <a:t>When designing your document give thought to the usability of the document.  Think about the audience and their needs.  </a:t>
+            </a:r>
+            <a:r>
+              <a:rPr lang="en-US" dirty="0" smtClean="0"/>
+              <a:t>What do you understand about how your students typically use your documents? What do they need to know from those documents?</a:t>
             </a:r>
             <a:endParaRPr lang="en-US" dirty="0"/>
           </a:p>
@@ -3884,45 +3996,13 @@
         <p:spPr/>
         <p:txBody>
           <a:bodyPr>
-            <a:normAutofit lnSpcReduction="10000"/>
+            <a:normAutofit fontScale="92500" lnSpcReduction="10000"/>
           </a:bodyPr>
           <a:lstStyle/>
           <a:p>
             <a:r>
               <a:rPr lang="en-US" dirty="0" smtClean="0"/>
-              <a:t>Think about the length of time the </a:t>
-            </a:r>
-            <a:r>
-              <a:rPr lang="en-US" dirty="0" smtClean="0"/>
-              <a:t>document </a:t>
-            </a:r>
-            <a:r>
-              <a:rPr lang="en-US" dirty="0" smtClean="0"/>
-              <a:t>will be available.  Pay attention to the number of individuals who will have access to this </a:t>
-            </a:r>
-            <a:r>
-              <a:rPr lang="en-US" dirty="0" smtClean="0"/>
-              <a:t>document </a:t>
-            </a:r>
-            <a:r>
-              <a:rPr lang="en-US" dirty="0" smtClean="0"/>
-              <a:t>over that period of time. </a:t>
-            </a:r>
-            <a:r>
-              <a:rPr lang="en-US" dirty="0" smtClean="0"/>
-              <a:t>Utilize </a:t>
-            </a:r>
-            <a:r>
-              <a:rPr lang="en-US" dirty="0" smtClean="0"/>
-              <a:t>these tips to make your </a:t>
-            </a:r>
-            <a:r>
-              <a:rPr lang="en-US" dirty="0" smtClean="0"/>
-              <a:t>document </a:t>
-            </a:r>
-            <a:r>
-              <a:rPr lang="en-US" dirty="0" smtClean="0"/>
-              <a:t>accessible to all parties who access it.  </a:t>
+              <a:t>Think about the length of time the document will be available.  Pay attention to the number of individuals who will have access to this document over that period of time. Utilize these tips to make your document accessible to all parties who access it.  </a:t>
             </a:r>
             <a:endParaRPr lang="en-US" dirty="0"/>
           </a:p>
@@ -3941,7 +4021,7 @@
   <p:timing>
     <p:tnLst>
       <p:par>
-        <p:cTn id="1" dur="indefinite" restart="never" nodeType="tmRoot"/>
+        <p:cTn xmlns:p14="http://schemas.microsoft.com/office/powerpoint/2010/main" id="1" dur="indefinite" restart="never" nodeType="tmRoot"/>
       </p:par>
     </p:tnLst>
   </p:timing>
@@ -3972,17 +4052,35 @@
             <a:spLocks noGrp="1"/>
           </p:cNvSpPr>
           <p:nvPr>
-            <p:ph type="title"/>
-          </p:nvPr>
-        </p:nvSpPr>
-        <p:spPr/>
-        <p:txBody>
-          <a:bodyPr/>
-          <a:lstStyle/>
-          <a:p>
-            <a:r>
-              <a:rPr lang="en-US" dirty="0" smtClean="0"/>
-              <a:t>Accessibility Checker</a:t>
+            <p:ph type="ctrTitle"/>
+          </p:nvPr>
+        </p:nvSpPr>
+        <p:spPr>
+          <a:xfrm>
+            <a:off x="685800" y="685800"/>
+            <a:ext cx="7772400" cy="762000"/>
+          </a:xfrm>
+        </p:spPr>
+        <p:txBody>
+          <a:bodyPr>
+            <a:normAutofit fontScale="90000"/>
+          </a:bodyPr>
+          <a:lstStyle/>
+          <a:p>
+            <a:r>
+              <a:rPr lang="en-US" dirty="0" smtClean="0"/>
+              <a:t>Accessible Course </a:t>
+            </a:r>
+            <a:r>
+              <a:rPr lang="en-US" dirty="0" smtClean="0"/>
+              <a:t>Documents</a:t>
+            </a:r>
+            <a:br>
+              <a:rPr lang="en-US" dirty="0" smtClean="0"/>
+            </a:br>
+            <a:r>
+              <a:rPr lang="en-US" dirty="0" smtClean="0"/>
+              <a:t>			</a:t>
             </a:r>
             <a:endParaRPr lang="en-US" dirty="0"/>
           </a:p>
@@ -3990,110 +4088,173 @@
       </p:sp>
       <p:sp>
         <p:nvSpPr>
-          <p:cNvPr id="3" name="Content Placeholder 2"/>
-          <p:cNvSpPr>
-            <a:spLocks noGrp="1"/>
-          </p:cNvSpPr>
-          <p:nvPr>
-            <p:ph sz="half" idx="1"/>
-          </p:nvPr>
-        </p:nvSpPr>
-        <p:spPr/>
-        <p:txBody>
-          <a:bodyPr>
-            <a:normAutofit fontScale="85000" lnSpcReduction="10000"/>
+          <p:cNvPr id="4" name="TextBox 3"/>
+          <p:cNvSpPr txBox="1"/>
+          <p:nvPr/>
+        </p:nvSpPr>
+        <p:spPr>
+          <a:xfrm>
+            <a:off x="3124200" y="1219200"/>
+            <a:ext cx="3352800" cy="3170099"/>
+          </a:xfrm>
+          <a:prstGeom prst="rect">
+            <a:avLst/>
+          </a:prstGeom>
+          <a:noFill/>
+        </p:spPr>
+        <p:txBody>
+          <a:bodyPr wrap="square" rtlCol="0">
+            <a:spAutoFit/>
           </a:bodyPr>
           <a:lstStyle/>
           <a:p>
             <a:r>
-              <a:rPr lang="en-US" dirty="0" smtClean="0"/>
-              <a:t>Each product from Microsoft, apple and google contains an accessibility checker.  After the </a:t>
-            </a:r>
-            <a:r>
-              <a:rPr lang="en-US" dirty="0" smtClean="0"/>
-              <a:t>completion </a:t>
-            </a:r>
-            <a:r>
-              <a:rPr lang="en-US" dirty="0" smtClean="0"/>
-              <a:t>of the </a:t>
-            </a:r>
-            <a:r>
-              <a:rPr lang="en-US" dirty="0" smtClean="0"/>
-              <a:t>document, </a:t>
-            </a:r>
-            <a:r>
-              <a:rPr lang="en-US" dirty="0" smtClean="0"/>
-              <a:t>it is a good idea to run this tool.  This tool will highlight </a:t>
-            </a:r>
-            <a:r>
-              <a:rPr lang="en-US" dirty="0" smtClean="0"/>
-              <a:t>attributes </a:t>
-            </a:r>
-            <a:r>
-              <a:rPr lang="en-US" dirty="0" smtClean="0"/>
-              <a:t>which are inaccessible.  This is a great way to get a basic overview of the accessibility of the </a:t>
-            </a:r>
-            <a:r>
-              <a:rPr lang="en-US" dirty="0" smtClean="0"/>
-              <a:t>document.  </a:t>
-            </a:r>
-            <a:endParaRPr lang="en-US" dirty="0"/>
-          </a:p>
-        </p:txBody>
-      </p:sp>
-      <p:sp>
-        <p:nvSpPr>
-          <p:cNvPr id="4" name="Content Placeholder 3"/>
-          <p:cNvSpPr>
-            <a:spLocks noGrp="1"/>
-          </p:cNvSpPr>
-          <p:nvPr>
-            <p:ph sz="half" idx="2"/>
-          </p:nvPr>
-        </p:nvSpPr>
-        <p:spPr/>
-        <p:txBody>
-          <a:bodyPr>
-            <a:normAutofit fontScale="85000" lnSpcReduction="10000"/>
+              <a:rPr lang="en-US" sz="4000" dirty="0" smtClean="0"/>
+              <a:t>S - styles</a:t>
+            </a:r>
+            <a:r>
+              <a:rPr lang="en-US" sz="4000" dirty="0"/>
+              <a:t/>
+            </a:r>
+            <a:br>
+              <a:rPr lang="en-US" sz="4000" dirty="0"/>
+            </a:br>
+            <a:r>
+              <a:rPr lang="en-US" sz="4000" dirty="0" smtClean="0"/>
+              <a:t>L - links</a:t>
+            </a:r>
+            <a:r>
+              <a:rPr lang="en-US" sz="4000" dirty="0"/>
+              <a:t/>
+            </a:r>
+            <a:br>
+              <a:rPr lang="en-US" sz="4000" dirty="0"/>
+            </a:br>
+            <a:r>
+              <a:rPr lang="en-US" sz="4000" dirty="0" smtClean="0"/>
+              <a:t>I - images</a:t>
+            </a:r>
+            <a:r>
+              <a:rPr lang="en-US" sz="4000" dirty="0"/>
+              <a:t/>
+            </a:r>
+            <a:br>
+              <a:rPr lang="en-US" sz="4000" dirty="0"/>
+            </a:br>
+            <a:r>
+              <a:rPr lang="en-US" sz="4000" dirty="0" smtClean="0"/>
+              <a:t>D - design</a:t>
+            </a:r>
+            <a:r>
+              <a:rPr lang="en-US" sz="4000" dirty="0"/>
+              <a:t/>
+            </a:r>
+            <a:br>
+              <a:rPr lang="en-US" sz="4000" dirty="0"/>
+            </a:br>
+            <a:r>
+              <a:rPr lang="en-US" sz="4000" dirty="0" smtClean="0"/>
+              <a:t>E - empathy</a:t>
+            </a:r>
+            <a:endParaRPr lang="en-US" sz="4000" dirty="0"/>
+          </a:p>
+        </p:txBody>
+      </p:sp>
+      <p:sp>
+        <p:nvSpPr>
+          <p:cNvPr id="5" name="TextBox 4"/>
+          <p:cNvSpPr txBox="1"/>
+          <p:nvPr/>
+        </p:nvSpPr>
+        <p:spPr>
+          <a:xfrm>
+            <a:off x="0" y="4611231"/>
+            <a:ext cx="9144000" cy="2246769"/>
+          </a:xfrm>
+          <a:prstGeom prst="rect">
+            <a:avLst/>
+          </a:prstGeom>
+          <a:noFill/>
+        </p:spPr>
+        <p:txBody>
+          <a:bodyPr wrap="square" rtlCol="0">
+            <a:spAutoFit/>
           </a:bodyPr>
           <a:lstStyle/>
           <a:p>
-            <a:r>
-              <a:rPr lang="en-US" dirty="0" smtClean="0"/>
-              <a:t>Please remember:</a:t>
-            </a:r>
-          </a:p>
-          <a:p>
-            <a:r>
-              <a:rPr lang="en-US" dirty="0" smtClean="0"/>
-              <a:t>This tool is a very basic accessibility checker,</a:t>
-            </a:r>
-          </a:p>
-          <a:p>
-            <a:r>
-              <a:rPr lang="en-US" dirty="0" smtClean="0"/>
-              <a:t>This tool may not pick up on specific accessibility violations,</a:t>
-            </a:r>
-          </a:p>
-          <a:p>
-            <a:r>
-              <a:rPr lang="en-US" dirty="0" smtClean="0"/>
-              <a:t>This tool becomes better with each update of the product</a:t>
-            </a:r>
-          </a:p>
-          <a:p>
-            <a:r>
-              <a:rPr lang="en-US" dirty="0" smtClean="0"/>
-              <a:t>Each company has made a commitment to the accessibility of the product.</a:t>
-            </a:r>
-            <a:endParaRPr lang="en-US" dirty="0"/>
+            <a:pPr algn="ctr"/>
+            <a:r>
+              <a:rPr lang="en-US" sz="2800" dirty="0" smtClean="0">
+                <a:solidFill>
+                  <a:schemeClr val="tx1">
+                    <a:lumMod val="50000"/>
+                    <a:lumOff val="50000"/>
+                  </a:schemeClr>
+                </a:solidFill>
+              </a:rPr>
+              <a:t>Scott Smith, Assistive Technology Specialist</a:t>
+            </a:r>
+          </a:p>
+          <a:p>
+            <a:pPr algn="ctr"/>
+            <a:r>
+              <a:rPr lang="en-US" sz="2800" dirty="0" err="1" smtClean="0">
+                <a:solidFill>
+                  <a:schemeClr val="tx1">
+                    <a:lumMod val="50000"/>
+                    <a:lumOff val="50000"/>
+                  </a:schemeClr>
+                </a:solidFill>
+              </a:rPr>
+              <a:t>dssmith@uscupstate.edu</a:t>
+            </a:r>
+            <a:endParaRPr lang="en-US" sz="2800" dirty="0" smtClean="0">
+              <a:solidFill>
+                <a:schemeClr val="tx1">
+                  <a:lumMod val="50000"/>
+                  <a:lumOff val="50000"/>
+                </a:schemeClr>
+              </a:solidFill>
+            </a:endParaRPr>
+          </a:p>
+          <a:p>
+            <a:pPr algn="ctr"/>
+            <a:r>
+              <a:rPr lang="en-US" sz="2800" dirty="0" smtClean="0">
+                <a:solidFill>
+                  <a:schemeClr val="tx1">
+                    <a:lumMod val="50000"/>
+                    <a:lumOff val="50000"/>
+                  </a:schemeClr>
+                </a:solidFill>
+              </a:rPr>
+              <a:t>864-503-5199</a:t>
+            </a:r>
+          </a:p>
+          <a:p>
+            <a:pPr algn="ctr"/>
+            <a:r>
+              <a:rPr lang="en-US" sz="2800" dirty="0" smtClean="0">
+                <a:solidFill>
+                  <a:schemeClr val="tx1">
+                    <a:lumMod val="50000"/>
+                    <a:lumOff val="50000"/>
+                  </a:schemeClr>
+                </a:solidFill>
+              </a:rPr>
+              <a:t>Campus Life Center, Suite 108</a:t>
+            </a:r>
+          </a:p>
+          <a:p>
+            <a:pPr algn="ctr"/>
+            <a:endParaRPr lang="en-US" sz="2800" dirty="0"/>
           </a:p>
         </p:txBody>
       </p:sp>
     </p:spTree>
     <p:extLst>
       <p:ext uri="{BB962C8B-B14F-4D97-AF65-F5344CB8AC3E}">
-        <p14:creationId xmlns:p14="http://schemas.microsoft.com/office/powerpoint/2010/main" val="191953494"/>
+        <p14:creationId xmlns:p14="http://schemas.microsoft.com/office/powerpoint/2010/main" val="4278308864"/>
       </p:ext>
     </p:extLst>
   </p:cSld>
@@ -4103,285 +4264,7 @@
   <p:timing>
     <p:tnLst>
       <p:par>
-        <p:cTn id="1" dur="indefinite" restart="never" nodeType="tmRoot"/>
-      </p:par>
-    </p:tnLst>
-  </p:timing>
-</p:sld>
-</file>
-
-<file path=ppt/slides/slide8.xml><?xml version="1.0" encoding="utf-8"?>
-<p:sld xmlns:a="http://schemas.openxmlformats.org/drawingml/2006/main" xmlns:r="http://schemas.openxmlformats.org/officeDocument/2006/relationships" xmlns:p="http://schemas.openxmlformats.org/presentationml/2006/main">
-  <p:cSld>
-    <p:spTree>
-      <p:nvGrpSpPr>
-        <p:cNvPr id="1" name=""/>
-        <p:cNvGrpSpPr/>
-        <p:nvPr/>
-      </p:nvGrpSpPr>
-      <p:grpSpPr>
-        <a:xfrm>
-          <a:off x="0" y="0"/>
-          <a:ext cx="0" cy="0"/>
-          <a:chOff x="0" y="0"/>
-          <a:chExt cx="0" cy="0"/>
-        </a:xfrm>
-      </p:grpSpPr>
-      <p:sp>
-        <p:nvSpPr>
-          <p:cNvPr id="2" name="Title 1"/>
-          <p:cNvSpPr>
-            <a:spLocks noGrp="1"/>
-          </p:cNvSpPr>
-          <p:nvPr>
-            <p:ph type="title"/>
-          </p:nvPr>
-        </p:nvSpPr>
-        <p:spPr/>
-        <p:txBody>
-          <a:bodyPr/>
-          <a:lstStyle/>
-          <a:p>
-            <a:r>
-              <a:rPr lang="en-US" dirty="0" smtClean="0"/>
-              <a:t>PDF</a:t>
-            </a:r>
-            <a:endParaRPr lang="en-US" dirty="0"/>
-          </a:p>
-        </p:txBody>
-      </p:sp>
-      <p:sp>
-        <p:nvSpPr>
-          <p:cNvPr id="3" name="Content Placeholder 2"/>
-          <p:cNvSpPr>
-            <a:spLocks noGrp="1"/>
-          </p:cNvSpPr>
-          <p:nvPr>
-            <p:ph sz="half" idx="1"/>
-          </p:nvPr>
-        </p:nvSpPr>
-        <p:spPr/>
-        <p:txBody>
-          <a:bodyPr>
-            <a:normAutofit fontScale="77500" lnSpcReduction="20000"/>
-          </a:bodyPr>
-          <a:lstStyle/>
-          <a:p>
-            <a:r>
-              <a:rPr lang="en-US" dirty="0" smtClean="0"/>
-              <a:t>The final step is to convert the </a:t>
-            </a:r>
-            <a:r>
-              <a:rPr lang="en-US" dirty="0" smtClean="0"/>
-              <a:t>document </a:t>
-            </a:r>
-            <a:r>
-              <a:rPr lang="en-US" dirty="0" smtClean="0"/>
-              <a:t>to Accessible PDF if desired.  </a:t>
-            </a:r>
-            <a:endParaRPr lang="en-US" dirty="0"/>
-          </a:p>
-        </p:txBody>
-      </p:sp>
-      <p:sp>
-        <p:nvSpPr>
-          <p:cNvPr id="4" name="Content Placeholder 3"/>
-          <p:cNvSpPr>
-            <a:spLocks noGrp="1"/>
-          </p:cNvSpPr>
-          <p:nvPr>
-            <p:ph sz="half" idx="2"/>
-          </p:nvPr>
-        </p:nvSpPr>
-        <p:spPr>
-          <a:xfrm>
-            <a:off x="4648200" y="1570037"/>
-            <a:ext cx="4038600" cy="4525963"/>
-          </a:xfrm>
-        </p:spPr>
-        <p:txBody>
-          <a:bodyPr>
-            <a:normAutofit fontScale="77500" lnSpcReduction="20000"/>
-          </a:bodyPr>
-          <a:lstStyle/>
-          <a:p>
-            <a:r>
-              <a:rPr lang="en-US" dirty="0" smtClean="0"/>
-              <a:t>Once you have insured that all </a:t>
-            </a:r>
-            <a:r>
-              <a:rPr lang="en-US" dirty="0" smtClean="0"/>
-              <a:t>images, </a:t>
-            </a:r>
-            <a:r>
-              <a:rPr lang="en-US" dirty="0" smtClean="0"/>
-              <a:t>graphics, charts, and other visual media have been properly described the </a:t>
-            </a:r>
-            <a:r>
-              <a:rPr lang="en-US" dirty="0" smtClean="0"/>
-              <a:t>document </a:t>
-            </a:r>
-            <a:r>
-              <a:rPr lang="en-US" dirty="0" smtClean="0"/>
-              <a:t>can be converted to PDF.  The conversion process will then automatically tag the pdf to work with assistive technology.  After the conversion is complete the </a:t>
-            </a:r>
-            <a:r>
-              <a:rPr lang="en-US" dirty="0" smtClean="0"/>
-              <a:t>document </a:t>
-            </a:r>
-            <a:r>
-              <a:rPr lang="en-US" dirty="0" smtClean="0"/>
-              <a:t>can again be checked with the accessibility checker tool. The reading from the tool should be similar to the previous reading with no accessibility errors.   </a:t>
-            </a:r>
-            <a:endParaRPr lang="en-US" dirty="0"/>
-          </a:p>
-        </p:txBody>
-      </p:sp>
-    </p:spTree>
-    <p:extLst>
-      <p:ext uri="{BB962C8B-B14F-4D97-AF65-F5344CB8AC3E}">
-        <p14:creationId xmlns:p14="http://schemas.microsoft.com/office/powerpoint/2010/main" val="4106265975"/>
-      </p:ext>
-    </p:extLst>
-  </p:cSld>
-  <p:clrMapOvr>
-    <a:masterClrMapping/>
-  </p:clrMapOvr>
-  <p:timing>
-    <p:tnLst>
-      <p:par>
-        <p:cTn id="1" dur="indefinite" restart="never" nodeType="tmRoot"/>
-      </p:par>
-    </p:tnLst>
-  </p:timing>
-</p:sld>
-</file>
-
-<file path=ppt/slides/slide9.xml><?xml version="1.0" encoding="utf-8"?>
-<p:sld xmlns:a="http://schemas.openxmlformats.org/drawingml/2006/main" xmlns:r="http://schemas.openxmlformats.org/officeDocument/2006/relationships" xmlns:p="http://schemas.openxmlformats.org/presentationml/2006/main">
-  <p:cSld>
-    <p:spTree>
-      <p:nvGrpSpPr>
-        <p:cNvPr id="1" name=""/>
-        <p:cNvGrpSpPr/>
-        <p:nvPr/>
-      </p:nvGrpSpPr>
-      <p:grpSpPr>
-        <a:xfrm>
-          <a:off x="0" y="0"/>
-          <a:ext cx="0" cy="0"/>
-          <a:chOff x="0" y="0"/>
-          <a:chExt cx="0" cy="0"/>
-        </a:xfrm>
-      </p:grpSpPr>
-      <p:sp>
-        <p:nvSpPr>
-          <p:cNvPr id="2" name="Title 1"/>
-          <p:cNvSpPr>
-            <a:spLocks noGrp="1"/>
-          </p:cNvSpPr>
-          <p:nvPr>
-            <p:ph type="title"/>
-          </p:nvPr>
-        </p:nvSpPr>
-        <p:spPr/>
-        <p:txBody>
-          <a:bodyPr/>
-          <a:lstStyle/>
-          <a:p>
-            <a:r>
-              <a:rPr lang="en-US" dirty="0" smtClean="0"/>
-              <a:t>Resources and Credits</a:t>
-            </a:r>
-            <a:endParaRPr lang="en-US" dirty="0"/>
-          </a:p>
-        </p:txBody>
-      </p:sp>
-      <p:sp>
-        <p:nvSpPr>
-          <p:cNvPr id="3" name="Content Placeholder 2"/>
-          <p:cNvSpPr>
-            <a:spLocks noGrp="1"/>
-          </p:cNvSpPr>
-          <p:nvPr>
-            <p:ph sz="half" idx="1"/>
-          </p:nvPr>
-        </p:nvSpPr>
-        <p:spPr/>
-        <p:txBody>
-          <a:bodyPr>
-            <a:normAutofit fontScale="92500" lnSpcReduction="10000"/>
-          </a:bodyPr>
-          <a:lstStyle/>
-          <a:p>
-            <a:r>
-              <a:rPr lang="en-US" dirty="0" smtClean="0"/>
-              <a:t>The University o South Carolina Upstate has an Assistive technology Specialist.  </a:t>
-            </a:r>
-          </a:p>
-          <a:p>
-            <a:pPr marL="0" indent="0">
-              <a:buNone/>
-            </a:pPr>
-            <a:r>
-              <a:rPr lang="en-US" dirty="0" smtClean="0"/>
-              <a:t>Please contact me through email at dssmith2@uscupstate.edu or by phone at 864-503-5199.  I am available to help you make any course materials accessible.  			</a:t>
-            </a:r>
-            <a:r>
-              <a:rPr lang="en-US" dirty="0" smtClean="0"/>
-              <a:t>Scott </a:t>
-            </a:r>
-            <a:r>
-              <a:rPr lang="en-US" dirty="0" smtClean="0"/>
-              <a:t>Smith</a:t>
-            </a:r>
-            <a:endParaRPr lang="en-US" dirty="0"/>
-          </a:p>
-        </p:txBody>
-      </p:sp>
-      <p:pic>
-        <p:nvPicPr>
-          <p:cNvPr id="5" name="Content Placeholder 4"/>
-          <p:cNvPicPr>
-            <a:picLocks noGrp="1" noChangeAspect="1"/>
-          </p:cNvPicPr>
-          <p:nvPr>
-            <p:ph sz="half" idx="2"/>
-          </p:nvPr>
-        </p:nvPicPr>
-        <p:blipFill>
-          <a:blip r:embed="rId2" cstate="print">
-            <a:extLst>
-              <a:ext uri="{28A0092B-C50C-407E-A947-70E740481C1C}">
-                <a14:useLocalDpi xmlns:a14="http://schemas.microsoft.com/office/drawing/2010/main" val="0"/>
-              </a:ext>
-            </a:extLst>
-          </a:blip>
-          <a:stretch>
-            <a:fillRect/>
-          </a:stretch>
-        </p:blipFill>
-        <p:spPr>
-          <a:xfrm>
-            <a:off x="5052286" y="1524000"/>
-            <a:ext cx="3230427" cy="4525963"/>
-          </a:xfrm>
-        </p:spPr>
-      </p:pic>
-    </p:spTree>
-    <p:extLst>
-      <p:ext uri="{BB962C8B-B14F-4D97-AF65-F5344CB8AC3E}">
-        <p14:creationId xmlns:p14="http://schemas.microsoft.com/office/powerpoint/2010/main" val="3274488732"/>
-      </p:ext>
-    </p:extLst>
-  </p:cSld>
-  <p:clrMapOvr>
-    <a:masterClrMapping/>
-  </p:clrMapOvr>
-  <p:timing>
-    <p:tnLst>
-      <p:par>
-        <p:cTn id="1" dur="indefinite" restart="never" nodeType="tmRoot"/>
+        <p:cTn xmlns:p14="http://schemas.microsoft.com/office/powerpoint/2010/main" id="1" dur="indefinite" restart="never" nodeType="tmRoot"/>
       </p:par>
     </p:tnLst>
   </p:timing>

</xml_diff>

<commit_message>
Course Materials Review updates
</commit_message>
<xml_diff>
--- a/slide-decks/ACCESS/how-to-review-course-materials/accessiblecoursedoccuments2016.pptx
+++ b/slide-decks/ACCESS/how-to-review-course-materials/accessiblecoursedoccuments2016.pptx
@@ -3125,11 +3125,7 @@
           <a:p>
             <a:r>
               <a:rPr lang="en-US" dirty="0" smtClean="0"/>
-              <a:t>Accessible Course </a:t>
-            </a:r>
-            <a:r>
-              <a:rPr lang="en-US" dirty="0" smtClean="0"/>
-              <a:t>Documents</a:t>
+              <a:t>Accessible Course Documents</a:t>
             </a:r>
             <a:br>
               <a:rPr lang="en-US" dirty="0" smtClean="0"/>
@@ -3248,27 +3244,8 @@
                   </a:schemeClr>
                 </a:solidFill>
               </a:rPr>
-              <a:t>Scott Smith, Assistive </a:t>
-            </a:r>
-            <a:r>
-              <a:rPr lang="en-US" sz="2800" smtClean="0">
-                <a:solidFill>
-                  <a:schemeClr val="tx1">
-                    <a:lumMod val="50000"/>
-                    <a:lumOff val="50000"/>
-                  </a:schemeClr>
-                </a:solidFill>
-              </a:rPr>
-              <a:t>Technology Specialist</a:t>
-            </a:r>
-            <a:endParaRPr lang="en-US" sz="2800" dirty="0" smtClean="0">
-              <a:solidFill>
-                <a:schemeClr val="tx1">
-                  <a:lumMod val="50000"/>
-                  <a:lumOff val="50000"/>
-                </a:schemeClr>
-              </a:solidFill>
-            </a:endParaRPr>
+              <a:t>Scott Smith, Assistive Technology Specialist</a:t>
+            </a:r>
           </a:p>
           <a:p>
             <a:pPr algn="ctr"/>
@@ -3317,8 +3294,38 @@
                   </a:schemeClr>
                 </a:solidFill>
               </a:rPr>
-              <a:t>Campus Life Center, Suite 108</a:t>
-            </a:r>
+              <a:t>Campus Life Center, </a:t>
+            </a:r>
+            <a:r>
+              <a:rPr lang="en-US" sz="2800" smtClean="0">
+                <a:solidFill>
+                  <a:schemeClr val="tx1">
+                    <a:lumMod val="50000"/>
+                    <a:lumOff val="50000"/>
+                  </a:schemeClr>
+                </a:solidFill>
+              </a:rPr>
+              <a:t>Suite </a:t>
+            </a:r>
+            <a:r>
+              <a:rPr lang="en-US" sz="2800" smtClean="0">
+                <a:solidFill>
+                  <a:schemeClr val="tx1">
+                    <a:lumMod val="50000"/>
+                    <a:lumOff val="50000"/>
+                  </a:schemeClr>
+                </a:solidFill>
+              </a:rPr>
+              <a:t>107</a:t>
+            </a:r>
+            <a:endParaRPr lang="en-US" sz="2800" dirty="0" smtClean="0">
+              <a:solidFill>
+                <a:schemeClr val="tx1">
+                  <a:lumMod val="50000"/>
+                  <a:lumOff val="50000"/>
+                </a:schemeClr>
+              </a:solidFill>
+            </a:endParaRPr>
           </a:p>
           <a:p>
             <a:pPr algn="ctr"/>
@@ -3403,46 +3410,30 @@
           <a:p>
             <a:r>
               <a:rPr lang="en-US" dirty="0" smtClean="0"/>
-              <a:t>Styles are the most important part of creating accessible course material. </a:t>
-            </a:r>
+              <a:t>Styles are the most important part of creating accessible course material. For one thing, they help you prepare your document for tagging if converting to PDF.  </a:t>
+            </a:r>
+            <a:endParaRPr lang="en-US" dirty="0"/>
+          </a:p>
+        </p:txBody>
+      </p:sp>
+      <p:sp>
+        <p:nvSpPr>
+          <p:cNvPr id="4" name="Content Placeholder 3"/>
+          <p:cNvSpPr>
+            <a:spLocks noGrp="1"/>
+          </p:cNvSpPr>
+          <p:nvPr>
+            <p:ph sz="half" idx="2"/>
+          </p:nvPr>
+        </p:nvSpPr>
+        <p:spPr/>
+        <p:txBody>
+          <a:bodyPr/>
+          <a:lstStyle/>
+          <a:p>
             <a:r>
               <a:rPr lang="en-US" dirty="0" smtClean="0"/>
-              <a:t>For one thing, they </a:t>
-            </a:r>
-            <a:r>
-              <a:rPr lang="en-US" dirty="0" smtClean="0"/>
-              <a:t>help you prepare your document for tagging if converting to PDF.  </a:t>
-            </a:r>
-            <a:endParaRPr lang="en-US" dirty="0"/>
-          </a:p>
-        </p:txBody>
-      </p:sp>
-      <p:sp>
-        <p:nvSpPr>
-          <p:cNvPr id="4" name="Content Placeholder 3"/>
-          <p:cNvSpPr>
-            <a:spLocks noGrp="1"/>
-          </p:cNvSpPr>
-          <p:nvPr>
-            <p:ph sz="half" idx="2"/>
-          </p:nvPr>
-        </p:nvSpPr>
-        <p:spPr/>
-        <p:txBody>
-          <a:bodyPr/>
-          <a:lstStyle/>
-          <a:p>
-            <a:r>
-              <a:rPr lang="en-US" dirty="0" smtClean="0"/>
-              <a:t>Headings help you arrange the document's information in an order of </a:t>
-            </a:r>
-            <a:r>
-              <a:rPr lang="en-US" dirty="0" smtClean="0"/>
-              <a:t>importance.  </a:t>
-            </a:r>
-            <a:r>
-              <a:rPr lang="en-US" dirty="0" smtClean="0"/>
-              <a:t>They also help screen reader users to more quickly navigate larger documents.  </a:t>
+              <a:t>Headings help you arrange the document's information in an order of importance.  They also help screen reader users to more quickly navigate larger documents.  </a:t>
             </a:r>
             <a:endParaRPr lang="en-US" dirty="0"/>
           </a:p>
@@ -3538,7 +3529,6 @@
               <a:rPr lang="en-US" dirty="0"/>
               <a:t>. The most common “Click Here” text is not appropriate.  This label does not tell the screen reader any information about the link as the screen reader user tabs through the document</a:t>
             </a:r>
-            <a:endParaRPr lang="en-US" dirty="0"/>
           </a:p>
         </p:txBody>
       </p:sp>
@@ -3576,7 +3566,6 @@
               <a:rPr lang="en-US" dirty="0"/>
               <a:t>use a feature called a links list to quickly pull all links from a document.  When the link is labeled as a “Click Here” link that is the only info given to the screen reader in this mode. </a:t>
             </a:r>
-            <a:endParaRPr lang="en-US" dirty="0"/>
           </a:p>
         </p:txBody>
       </p:sp>
@@ -3659,19 +3648,7 @@
           <a:p>
             <a:r>
               <a:rPr lang="en-US" dirty="0" smtClean="0"/>
-              <a:t>P</a:t>
-            </a:r>
-            <a:r>
-              <a:rPr lang="en-US" dirty="0" smtClean="0"/>
-              <a:t>rovide </a:t>
-            </a:r>
-            <a:r>
-              <a:rPr lang="en-US" dirty="0" smtClean="0"/>
-              <a:t>an alternate text description for all images within a document. </a:t>
-            </a:r>
-            <a:r>
-              <a:rPr lang="en-US" dirty="0" smtClean="0"/>
-              <a:t>When you do this, </a:t>
+              <a:t>Provide an alternate text description for all images within a document. When you do this, </a:t>
             </a:r>
             <a:r>
               <a:rPr lang="en-US" dirty="0"/>
@@ -3679,11 +3656,7 @@
             </a:r>
             <a:r>
               <a:rPr lang="en-US" dirty="0" smtClean="0"/>
-              <a:t>creen reader users will be able to hear your textual description of the image. Alternative text also helps search </a:t>
-            </a:r>
-            <a:r>
-              <a:rPr lang="en-US" dirty="0" smtClean="0"/>
-              <a:t>engines index content.</a:t>
+              <a:t>creen reader users will be able to hear your textual description of the image. Alternative text also helps search engines index content.</a:t>
             </a:r>
             <a:endParaRPr lang="en-US" dirty="0"/>
           </a:p>
@@ -3713,31 +3686,7 @@
           <a:p>
             <a:r>
               <a:rPr lang="en-US" dirty="0" smtClean="0"/>
-              <a:t>When an image does not have a text description, a screen reader user </a:t>
-            </a:r>
-            <a:r>
-              <a:rPr lang="en-US" dirty="0" smtClean="0"/>
-              <a:t>usually hears </a:t>
-            </a:r>
-            <a:r>
-              <a:rPr lang="en-US" dirty="0" smtClean="0"/>
-              <a:t>something </a:t>
-            </a:r>
-            <a:r>
-              <a:rPr lang="en-US" dirty="0" smtClean="0"/>
-              <a:t>random associated with the image. They most commonly hear </a:t>
-            </a:r>
-            <a:r>
-              <a:rPr lang="en-US" dirty="0" smtClean="0"/>
-              <a:t>“image” and a series of numbers.  This is meaningless to the screen reader user, </a:t>
-            </a:r>
-            <a:r>
-              <a:rPr lang="en-US" dirty="0" smtClean="0"/>
-              <a:t>and often time-consuming </a:t>
-            </a:r>
-            <a:r>
-              <a:rPr lang="en-US" dirty="0" smtClean="0"/>
-              <a:t>as the numbers are sometimes very lengthy. </a:t>
+              <a:t>When an image does not have a text description, a screen reader user usually hears something random associated with the image. They most commonly hear “image” and a series of numbers.  This is meaningless to the screen reader user, and often time-consuming as the numbers are sometimes very lengthy. </a:t>
             </a:r>
             <a:endParaRPr lang="en-US" dirty="0"/>
           </a:p>
@@ -3822,15 +3771,7 @@
           <a:p>
             <a:r>
               <a:rPr lang="en-US" dirty="0" smtClean="0"/>
-              <a:t>When designing a document please </a:t>
-            </a:r>
-            <a:r>
-              <a:rPr lang="en-US" dirty="0" smtClean="0"/>
-              <a:t>ensure </a:t>
-            </a:r>
-            <a:r>
-              <a:rPr lang="en-US" dirty="0" smtClean="0"/>
-              <a:t>that there is sufficient contrast between text and background.</a:t>
+              <a:t>When designing a document please ensure that there is sufficient contrast between text and background.</a:t>
             </a:r>
           </a:p>
           <a:p>
@@ -3872,23 +3813,7 @@
           <a:p>
             <a:r>
               <a:rPr lang="en-US" dirty="0" smtClean="0"/>
-              <a:t>Cohesive design is key to the reader’s </a:t>
-            </a:r>
-            <a:r>
-              <a:rPr lang="en-US" dirty="0" smtClean="0"/>
-              <a:t>understanding of the information </a:t>
-            </a:r>
-            <a:r>
-              <a:rPr lang="en-US" dirty="0" smtClean="0"/>
-              <a:t>in a document.  When designing a </a:t>
-            </a:r>
-            <a:r>
-              <a:rPr lang="en-US" dirty="0" smtClean="0"/>
-              <a:t>document, </a:t>
-            </a:r>
-            <a:r>
-              <a:rPr lang="en-US" dirty="0" smtClean="0"/>
-              <a:t>use predictable patterns to make navigation quicker for readers who may use alternative technology to access the document.</a:t>
+              <a:t>Cohesive design is key to the reader’s understanding of the information in a document.  When designing a document, use predictable patterns to make navigation quicker for readers who may use alternative technology to access the document.</a:t>
             </a:r>
             <a:endParaRPr lang="en-US" dirty="0"/>
           </a:p>
@@ -3973,11 +3898,7 @@
           <a:p>
             <a:r>
               <a:rPr lang="en-US" dirty="0" smtClean="0"/>
-              <a:t>When designing your document give thought to the usability of the document.  Think about the audience and their needs.  </a:t>
-            </a:r>
-            <a:r>
-              <a:rPr lang="en-US" dirty="0" smtClean="0"/>
-              <a:t>What do you understand about how your students typically use your documents? What do they need to know from those documents?</a:t>
+              <a:t>When designing your document give thought to the usability of the document.  Think about the audience and their needs.  What do you understand about how your students typically use your documents? What do they need to know from those documents?</a:t>
             </a:r>
             <a:endParaRPr lang="en-US" dirty="0"/>
           </a:p>
@@ -4069,11 +3990,7 @@
           <a:p>
             <a:r>
               <a:rPr lang="en-US" dirty="0" smtClean="0"/>
-              <a:t>Accessible Course </a:t>
-            </a:r>
-            <a:r>
-              <a:rPr lang="en-US" dirty="0" smtClean="0"/>
-              <a:t>Documents</a:t>
+              <a:t>Accessible Course Documents</a:t>
             </a:r>
             <a:br>
               <a:rPr lang="en-US" dirty="0" smtClean="0"/>

</xml_diff>